<commit_message>
Added domain activity slides.
</commit_message>
<xml_diff>
--- a/doc/Domain Driven Design.pptx
+++ b/doc/Domain Driven Design.pptx
@@ -5,7 +5,7 @@
     <p:sldMasterId id="2147483648" r:id="rId1"/>
   </p:sldMasterIdLst>
   <p:notesMasterIdLst>
-    <p:notesMasterId r:id="rId7"/>
+    <p:notesMasterId r:id="rId9"/>
   </p:notesMasterIdLst>
   <p:sldIdLst>
     <p:sldId id="256" r:id="rId2"/>
@@ -13,6 +13,8 @@
     <p:sldId id="259" r:id="rId4"/>
     <p:sldId id="261" r:id="rId5"/>
     <p:sldId id="260" r:id="rId6"/>
+    <p:sldId id="262" r:id="rId7"/>
+    <p:sldId id="263" r:id="rId8"/>
   </p:sldIdLst>
   <p:sldSz cx="12192000" cy="6858000"/>
   <p:notesSz cx="6858000" cy="9144000"/>
@@ -111,6 +113,11 @@
       </a:defRPr>
     </a:lvl9pPr>
   </p:defaultTextStyle>
+  <p:extLst>
+    <p:ext uri="{EFAFB233-063F-42B5-8137-9DF3F51BA10A}">
+      <p15:sldGuideLst xmlns:p15="http://schemas.microsoft.com/office/powerpoint/2012/main"/>
+    </p:ext>
+  </p:extLst>
 </p:presentation>
 </file>
 
@@ -208,7 +215,7 @@
           <a:p>
             <a:fld id="{B2BC0E29-F4A7-470D-B043-9D87EE208D8C}" type="datetimeFigureOut">
               <a:rPr lang="en-AU" smtClean="0"/>
-              <a:t>16/09/2020</a:t>
+              <a:t>24/09/2020</a:t>
             </a:fld>
             <a:endParaRPr lang="en-AU"/>
           </a:p>
@@ -520,16 +527,6 @@
           <a:bodyPr/>
           <a:lstStyle/>
           <a:p>
-            <a:r>
-              <a:rPr lang="en-US" dirty="0"/>
-              <a:t>A model that can be understood and interpreted seamlessly between domain expert(s) and developer(s)</a:t>
-            </a:r>
-          </a:p>
-          <a:p>
-            <a:r>
-              <a:rPr lang="en-US" dirty="0"/>
-              <a:t>Understanding the terms used by the domain experts and developers and trying to have an organized set of terms which can be unambiguously understood by both participants</a:t>
-            </a:r>
             <a:endParaRPr lang="en-AU" dirty="0"/>
           </a:p>
         </p:txBody>
@@ -551,7 +548,7 @@
           <a:p>
             <a:fld id="{60C365C7-A330-431F-BB26-157D1BD691B1}" type="slidenum">
               <a:rPr lang="en-AU" smtClean="0"/>
-              <a:t>2</a:t>
+              <a:t>1</a:t>
             </a:fld>
             <a:endParaRPr lang="en-AU"/>
           </a:p>
@@ -560,7 +557,7 @@
     </p:spTree>
     <p:extLst>
       <p:ext uri="{BB962C8B-B14F-4D97-AF65-F5344CB8AC3E}">
-        <p14:creationId xmlns:p14="http://schemas.microsoft.com/office/powerpoint/2010/main" val="3029419868"/>
+        <p14:creationId xmlns:p14="http://schemas.microsoft.com/office/powerpoint/2010/main" val="933637574"/>
       </p:ext>
     </p:extLst>
   </p:cSld>
@@ -615,45 +612,14 @@
           <a:lstStyle/>
           <a:p>
             <a:r>
-              <a:rPr lang="en-AU" dirty="0"/>
-              <a:t>Domain == problem </a:t>
-            </a:r>
-          </a:p>
-          <a:p>
-            <a:r>
-              <a:rPr lang="en-AU" dirty="0"/>
-              <a:t>Model </a:t>
-            </a:r>
-            <a:r>
-              <a:rPr lang="en-AU"/>
-              <a:t>== solution</a:t>
-            </a:r>
-          </a:p>
-          <a:p>
-            <a:endParaRPr lang="en-AU" dirty="0"/>
-          </a:p>
-          <a:p>
-            <a:r>
               <a:rPr lang="en-US" dirty="0"/>
-              <a:t>Can be expressed in several ways:  </a:t>
+              <a:t>A model that can be understood and interpreted seamlessly between domain expert(s) and developer(s)</a:t>
             </a:r>
           </a:p>
           <a:p>
             <a:r>
               <a:rPr lang="en-US" dirty="0"/>
-              <a:t>Code </a:t>
-            </a:r>
-          </a:p>
-          <a:p>
-            <a:r>
-              <a:rPr lang="en-US" dirty="0"/>
-              <a:t>Diagrams </a:t>
-            </a:r>
-          </a:p>
-          <a:p>
-            <a:r>
-              <a:rPr lang="en-US" dirty="0"/>
-              <a:t>Written Documentation</a:t>
+              <a:t>Understanding the terms used by the domain experts and developers and trying to have an organized set of terms which can be unambiguously understood by both participants</a:t>
             </a:r>
             <a:endParaRPr lang="en-AU" dirty="0"/>
           </a:p>
@@ -676,7 +642,7 @@
           <a:p>
             <a:fld id="{60C365C7-A330-431F-BB26-157D1BD691B1}" type="slidenum">
               <a:rPr lang="en-AU" smtClean="0"/>
-              <a:t>3</a:t>
+              <a:t>2</a:t>
             </a:fld>
             <a:endParaRPr lang="en-AU"/>
           </a:p>
@@ -685,7 +651,7 @@
     </p:spTree>
     <p:extLst>
       <p:ext uri="{BB962C8B-B14F-4D97-AF65-F5344CB8AC3E}">
-        <p14:creationId xmlns:p14="http://schemas.microsoft.com/office/powerpoint/2010/main" val="3201739729"/>
+        <p14:creationId xmlns:p14="http://schemas.microsoft.com/office/powerpoint/2010/main" val="3029419868"/>
       </p:ext>
     </p:extLst>
   </p:cSld>
@@ -740,46 +706,46 @@
           <a:lstStyle/>
           <a:p>
             <a:r>
+              <a:rPr lang="en-AU" dirty="0"/>
+              <a:t>Domain == problem </a:t>
+            </a:r>
+          </a:p>
+          <a:p>
+            <a:r>
+              <a:rPr lang="en-AU" dirty="0"/>
+              <a:t>Model </a:t>
+            </a:r>
+            <a:r>
+              <a:rPr lang="en-AU"/>
+              <a:t>== solution</a:t>
+            </a:r>
+          </a:p>
+          <a:p>
+            <a:endParaRPr lang="en-AU" dirty="0"/>
+          </a:p>
+          <a:p>
+            <a:r>
               <a:rPr lang="en-US" dirty="0"/>
-              <a:t>Entities: Unique identity(string ,integer or any other single attribute ) for an Entity (object)e objects</a:t>
-            </a:r>
-          </a:p>
-          <a:p>
-            <a:endParaRPr lang="en-US" dirty="0"/>
+              <a:t>Can be expressed in several ways:  </a:t>
+            </a:r>
           </a:p>
           <a:p>
             <a:r>
               <a:rPr lang="en-US" dirty="0"/>
-              <a:t>Value Objects:  When only the attributes of an object are important considerations then such an object is classified as a Value Object. </a:t>
-            </a:r>
-          </a:p>
-          <a:p>
-            <a:endParaRPr lang="en-US" dirty="0"/>
-          </a:p>
-          <a:p>
-            <a:pPr marL="0" marR="0" lvl="0" indent="0" algn="l" defTabSz="914400" rtl="0" eaLnBrk="1" fontAlgn="auto" latinLnBrk="0" hangingPunct="1">
-              <a:lnSpc>
-                <a:spcPct val="100000"/>
-              </a:lnSpc>
-              <a:spcBef>
-                <a:spcPts val="0"/>
-              </a:spcBef>
-              <a:spcAft>
-                <a:spcPts val="0"/>
-              </a:spcAft>
-              <a:buClrTx/>
-              <a:buSzTx/>
-              <a:buFontTx/>
-              <a:buNone/>
-              <a:tabLst/>
-              <a:defRPr/>
-            </a:pPr>
+              <a:t>Code </a:t>
+            </a:r>
+          </a:p>
+          <a:p>
             <a:r>
               <a:rPr lang="en-US" dirty="0"/>
-              <a:t>Service: Some concepts from domain are not capable to be modeled as entity or Value objects and hence called Services. </a:t>
-            </a:r>
-          </a:p>
-          <a:p>
+              <a:t>Diagrams </a:t>
+            </a:r>
+          </a:p>
+          <a:p>
+            <a:r>
+              <a:rPr lang="en-US" dirty="0"/>
+              <a:t>Written Documentation</a:t>
+            </a:r>
             <a:endParaRPr lang="en-AU" dirty="0"/>
           </a:p>
         </p:txBody>
@@ -801,7 +767,7 @@
           <a:p>
             <a:fld id="{60C365C7-A330-431F-BB26-157D1BD691B1}" type="slidenum">
               <a:rPr lang="en-AU" smtClean="0"/>
-              <a:t>4</a:t>
+              <a:t>3</a:t>
             </a:fld>
             <a:endParaRPr lang="en-AU"/>
           </a:p>
@@ -810,7 +776,7 @@
     </p:spTree>
     <p:extLst>
       <p:ext uri="{BB962C8B-B14F-4D97-AF65-F5344CB8AC3E}">
-        <p14:creationId xmlns:p14="http://schemas.microsoft.com/office/powerpoint/2010/main" val="3475517152"/>
+        <p14:creationId xmlns:p14="http://schemas.microsoft.com/office/powerpoint/2010/main" val="3201739729"/>
       </p:ext>
     </p:extLst>
   </p:cSld>
@@ -866,6 +832,131 @@
           <a:p>
             <a:r>
               <a:rPr lang="en-US" dirty="0"/>
+              <a:t>Entities: Unique identity(string ,integer or any other single attribute ) for an Entity (object)e objects</a:t>
+            </a:r>
+          </a:p>
+          <a:p>
+            <a:endParaRPr lang="en-US" dirty="0"/>
+          </a:p>
+          <a:p>
+            <a:r>
+              <a:rPr lang="en-US" dirty="0"/>
+              <a:t>Value Objects:  When only the attributes of an object are important considerations then such an object is classified as a Value Object. </a:t>
+            </a:r>
+          </a:p>
+          <a:p>
+            <a:endParaRPr lang="en-US" dirty="0"/>
+          </a:p>
+          <a:p>
+            <a:pPr marL="0" marR="0" lvl="0" indent="0" algn="l" defTabSz="914400" rtl="0" eaLnBrk="1" fontAlgn="auto" latinLnBrk="0" hangingPunct="1">
+              <a:lnSpc>
+                <a:spcPct val="100000"/>
+              </a:lnSpc>
+              <a:spcBef>
+                <a:spcPts val="0"/>
+              </a:spcBef>
+              <a:spcAft>
+                <a:spcPts val="0"/>
+              </a:spcAft>
+              <a:buClrTx/>
+              <a:buSzTx/>
+              <a:buFontTx/>
+              <a:buNone/>
+              <a:tabLst/>
+              <a:defRPr/>
+            </a:pPr>
+            <a:r>
+              <a:rPr lang="en-US" dirty="0"/>
+              <a:t>Service: Some concepts from domain are not capable to be modeled as entity or Value objects and hence called Services. </a:t>
+            </a:r>
+          </a:p>
+          <a:p>
+            <a:endParaRPr lang="en-AU" dirty="0"/>
+          </a:p>
+        </p:txBody>
+      </p:sp>
+      <p:sp>
+        <p:nvSpPr>
+          <p:cNvPr id="4" name="Slide Number Placeholder 3"/>
+          <p:cNvSpPr>
+            <a:spLocks noGrp="1"/>
+          </p:cNvSpPr>
+          <p:nvPr>
+            <p:ph type="sldNum" sz="quarter" idx="5"/>
+          </p:nvPr>
+        </p:nvSpPr>
+        <p:spPr/>
+        <p:txBody>
+          <a:bodyPr/>
+          <a:lstStyle/>
+          <a:p>
+            <a:fld id="{60C365C7-A330-431F-BB26-157D1BD691B1}" type="slidenum">
+              <a:rPr lang="en-AU" smtClean="0"/>
+              <a:t>4</a:t>
+            </a:fld>
+            <a:endParaRPr lang="en-AU"/>
+          </a:p>
+        </p:txBody>
+      </p:sp>
+    </p:spTree>
+    <p:extLst>
+      <p:ext uri="{BB962C8B-B14F-4D97-AF65-F5344CB8AC3E}">
+        <p14:creationId xmlns:p14="http://schemas.microsoft.com/office/powerpoint/2010/main" val="3475517152"/>
+      </p:ext>
+    </p:extLst>
+  </p:cSld>
+  <p:clrMapOvr>
+    <a:masterClrMapping/>
+  </p:clrMapOvr>
+</p:notes>
+</file>
+
+<file path=ppt/notesSlides/notesSlide5.xml><?xml version="1.0" encoding="utf-8"?>
+<p:notes xmlns:a="http://schemas.openxmlformats.org/drawingml/2006/main" xmlns:r="http://schemas.openxmlformats.org/officeDocument/2006/relationships" xmlns:p="http://schemas.openxmlformats.org/presentationml/2006/main">
+  <p:cSld>
+    <p:spTree>
+      <p:nvGrpSpPr>
+        <p:cNvPr id="1" name=""/>
+        <p:cNvGrpSpPr/>
+        <p:nvPr/>
+      </p:nvGrpSpPr>
+      <p:grpSpPr>
+        <a:xfrm>
+          <a:off x="0" y="0"/>
+          <a:ext cx="0" cy="0"/>
+          <a:chOff x="0" y="0"/>
+          <a:chExt cx="0" cy="0"/>
+        </a:xfrm>
+      </p:grpSpPr>
+      <p:sp>
+        <p:nvSpPr>
+          <p:cNvPr id="2" name="Slide Image Placeholder 1"/>
+          <p:cNvSpPr>
+            <a:spLocks noGrp="1" noRot="1" noChangeAspect="1"/>
+          </p:cNvSpPr>
+          <p:nvPr>
+            <p:ph type="sldImg"/>
+          </p:nvPr>
+        </p:nvSpPr>
+        <p:spPr/>
+      </p:sp>
+      <p:sp>
+        <p:nvSpPr>
+          <p:cNvPr id="3" name="Notes Placeholder 2"/>
+          <p:cNvSpPr>
+            <a:spLocks noGrp="1"/>
+          </p:cNvSpPr>
+          <p:nvPr>
+            <p:ph type="body" idx="1"/>
+          </p:nvPr>
+        </p:nvSpPr>
+        <p:spPr/>
+        <p:txBody>
+          <a:bodyPr/>
+          <a:lstStyle/>
+          <a:p>
+            <a:r>
+              <a:rPr lang="en-US" dirty="0"/>
               <a:t>An Aggregate is a cluster of Entities and Value objects.</a:t>
             </a:r>
             <a:endParaRPr lang="en-AU" dirty="0"/>
@@ -899,6 +990,94 @@
     <p:extLst>
       <p:ext uri="{BB962C8B-B14F-4D97-AF65-F5344CB8AC3E}">
         <p14:creationId xmlns:p14="http://schemas.microsoft.com/office/powerpoint/2010/main" val="640718168"/>
+      </p:ext>
+    </p:extLst>
+  </p:cSld>
+  <p:clrMapOvr>
+    <a:masterClrMapping/>
+  </p:clrMapOvr>
+</p:notes>
+</file>
+
+<file path=ppt/notesSlides/notesSlide6.xml><?xml version="1.0" encoding="utf-8"?>
+<p:notes xmlns:a="http://schemas.openxmlformats.org/drawingml/2006/main" xmlns:r="http://schemas.openxmlformats.org/officeDocument/2006/relationships" xmlns:p="http://schemas.openxmlformats.org/presentationml/2006/main">
+  <p:cSld>
+    <p:spTree>
+      <p:nvGrpSpPr>
+        <p:cNvPr id="1" name=""/>
+        <p:cNvGrpSpPr/>
+        <p:nvPr/>
+      </p:nvGrpSpPr>
+      <p:grpSpPr>
+        <a:xfrm>
+          <a:off x="0" y="0"/>
+          <a:ext cx="0" cy="0"/>
+          <a:chOff x="0" y="0"/>
+          <a:chExt cx="0" cy="0"/>
+        </a:xfrm>
+      </p:grpSpPr>
+      <p:sp>
+        <p:nvSpPr>
+          <p:cNvPr id="2" name="Slide Image Placeholder 1"/>
+          <p:cNvSpPr>
+            <a:spLocks noGrp="1" noRot="1" noChangeAspect="1"/>
+          </p:cNvSpPr>
+          <p:nvPr>
+            <p:ph type="sldImg"/>
+          </p:nvPr>
+        </p:nvSpPr>
+        <p:spPr/>
+      </p:sp>
+      <p:sp>
+        <p:nvSpPr>
+          <p:cNvPr id="3" name="Notes Placeholder 2"/>
+          <p:cNvSpPr>
+            <a:spLocks noGrp="1"/>
+          </p:cNvSpPr>
+          <p:nvPr>
+            <p:ph type="body" idx="1"/>
+          </p:nvPr>
+        </p:nvSpPr>
+        <p:spPr/>
+        <p:txBody>
+          <a:bodyPr/>
+          <a:lstStyle/>
+          <a:p>
+            <a:r>
+              <a:rPr lang="en-US" dirty="0"/>
+              <a:t>Demo project</a:t>
+            </a:r>
+            <a:endParaRPr lang="en-AU" dirty="0"/>
+          </a:p>
+        </p:txBody>
+      </p:sp>
+      <p:sp>
+        <p:nvSpPr>
+          <p:cNvPr id="4" name="Slide Number Placeholder 3"/>
+          <p:cNvSpPr>
+            <a:spLocks noGrp="1"/>
+          </p:cNvSpPr>
+          <p:nvPr>
+            <p:ph type="sldNum" sz="quarter" idx="5"/>
+          </p:nvPr>
+        </p:nvSpPr>
+        <p:spPr/>
+        <p:txBody>
+          <a:bodyPr/>
+          <a:lstStyle/>
+          <a:p>
+            <a:fld id="{60C365C7-A330-431F-BB26-157D1BD691B1}" type="slidenum">
+              <a:rPr lang="en-AU" smtClean="0"/>
+              <a:t>6</a:t>
+            </a:fld>
+            <a:endParaRPr lang="en-AU"/>
+          </a:p>
+        </p:txBody>
+      </p:sp>
+    </p:spTree>
+    <p:extLst>
+      <p:ext uri="{BB962C8B-B14F-4D97-AF65-F5344CB8AC3E}">
+        <p14:creationId xmlns:p14="http://schemas.microsoft.com/office/powerpoint/2010/main" val="1331794658"/>
       </p:ext>
     </p:extLst>
   </p:cSld>
@@ -1057,7 +1236,7 @@
           <a:p>
             <a:fld id="{CA5B32C8-1311-4A7C-848A-32FDCC8DCE7A}" type="datetimeFigureOut">
               <a:rPr lang="en-AU" smtClean="0"/>
-              <a:t>16/09/2020</a:t>
+              <a:t>24/09/2020</a:t>
             </a:fld>
             <a:endParaRPr lang="en-AU"/>
           </a:p>
@@ -1257,7 +1436,7 @@
           <a:p>
             <a:fld id="{CA5B32C8-1311-4A7C-848A-32FDCC8DCE7A}" type="datetimeFigureOut">
               <a:rPr lang="en-AU" smtClean="0"/>
-              <a:t>16/09/2020</a:t>
+              <a:t>24/09/2020</a:t>
             </a:fld>
             <a:endParaRPr lang="en-AU"/>
           </a:p>
@@ -1467,7 +1646,7 @@
           <a:p>
             <a:fld id="{CA5B32C8-1311-4A7C-848A-32FDCC8DCE7A}" type="datetimeFigureOut">
               <a:rPr lang="en-AU" smtClean="0"/>
-              <a:t>16/09/2020</a:t>
+              <a:t>24/09/2020</a:t>
             </a:fld>
             <a:endParaRPr lang="en-AU"/>
           </a:p>
@@ -1667,7 +1846,7 @@
           <a:p>
             <a:fld id="{CA5B32C8-1311-4A7C-848A-32FDCC8DCE7A}" type="datetimeFigureOut">
               <a:rPr lang="en-AU" smtClean="0"/>
-              <a:t>16/09/2020</a:t>
+              <a:t>24/09/2020</a:t>
             </a:fld>
             <a:endParaRPr lang="en-AU"/>
           </a:p>
@@ -1943,7 +2122,7 @@
           <a:p>
             <a:fld id="{CA5B32C8-1311-4A7C-848A-32FDCC8DCE7A}" type="datetimeFigureOut">
               <a:rPr lang="en-AU" smtClean="0"/>
-              <a:t>16/09/2020</a:t>
+              <a:t>24/09/2020</a:t>
             </a:fld>
             <a:endParaRPr lang="en-AU"/>
           </a:p>
@@ -2211,7 +2390,7 @@
           <a:p>
             <a:fld id="{CA5B32C8-1311-4A7C-848A-32FDCC8DCE7A}" type="datetimeFigureOut">
               <a:rPr lang="en-AU" smtClean="0"/>
-              <a:t>16/09/2020</a:t>
+              <a:t>24/09/2020</a:t>
             </a:fld>
             <a:endParaRPr lang="en-AU"/>
           </a:p>
@@ -2626,7 +2805,7 @@
           <a:p>
             <a:fld id="{CA5B32C8-1311-4A7C-848A-32FDCC8DCE7A}" type="datetimeFigureOut">
               <a:rPr lang="en-AU" smtClean="0"/>
-              <a:t>16/09/2020</a:t>
+              <a:t>24/09/2020</a:t>
             </a:fld>
             <a:endParaRPr lang="en-AU"/>
           </a:p>
@@ -2768,7 +2947,7 @@
           <a:p>
             <a:fld id="{CA5B32C8-1311-4A7C-848A-32FDCC8DCE7A}" type="datetimeFigureOut">
               <a:rPr lang="en-AU" smtClean="0"/>
-              <a:t>16/09/2020</a:t>
+              <a:t>24/09/2020</a:t>
             </a:fld>
             <a:endParaRPr lang="en-AU"/>
           </a:p>
@@ -2881,7 +3060,7 @@
           <a:p>
             <a:fld id="{CA5B32C8-1311-4A7C-848A-32FDCC8DCE7A}" type="datetimeFigureOut">
               <a:rPr lang="en-AU" smtClean="0"/>
-              <a:t>16/09/2020</a:t>
+              <a:t>24/09/2020</a:t>
             </a:fld>
             <a:endParaRPr lang="en-AU"/>
           </a:p>
@@ -3194,7 +3373,7 @@
           <a:p>
             <a:fld id="{CA5B32C8-1311-4A7C-848A-32FDCC8DCE7A}" type="datetimeFigureOut">
               <a:rPr lang="en-AU" smtClean="0"/>
-              <a:t>16/09/2020</a:t>
+              <a:t>24/09/2020</a:t>
             </a:fld>
             <a:endParaRPr lang="en-AU"/>
           </a:p>
@@ -3483,7 +3662,7 @@
           <a:p>
             <a:fld id="{CA5B32C8-1311-4A7C-848A-32FDCC8DCE7A}" type="datetimeFigureOut">
               <a:rPr lang="en-AU" smtClean="0"/>
-              <a:t>16/09/2020</a:t>
+              <a:t>24/09/2020</a:t>
             </a:fld>
             <a:endParaRPr lang="en-AU"/>
           </a:p>
@@ -3726,7 +3905,7 @@
           <a:p>
             <a:fld id="{CA5B32C8-1311-4A7C-848A-32FDCC8DCE7A}" type="datetimeFigureOut">
               <a:rPr lang="en-AU" smtClean="0"/>
-              <a:t>16/09/2020</a:t>
+              <a:t>24/09/2020</a:t>
             </a:fld>
             <a:endParaRPr lang="en-AU"/>
           </a:p>
@@ -4545,6 +4724,617 @@
     <p:extLst>
       <p:ext uri="{BB962C8B-B14F-4D97-AF65-F5344CB8AC3E}">
         <p14:creationId xmlns:p14="http://schemas.microsoft.com/office/powerpoint/2010/main" val="818614045"/>
+      </p:ext>
+    </p:extLst>
+  </p:cSld>
+  <p:clrMapOvr>
+    <a:masterClrMapping/>
+  </p:clrMapOvr>
+</p:sld>
+</file>
+
+<file path=ppt/slides/slide6.xml><?xml version="1.0" encoding="utf-8"?>
+<p:sld xmlns:a="http://schemas.openxmlformats.org/drawingml/2006/main" xmlns:r="http://schemas.openxmlformats.org/officeDocument/2006/relationships" xmlns:p="http://schemas.openxmlformats.org/presentationml/2006/main">
+  <p:cSld>
+    <p:spTree>
+      <p:nvGrpSpPr>
+        <p:cNvPr id="1" name=""/>
+        <p:cNvGrpSpPr/>
+        <p:nvPr/>
+      </p:nvGrpSpPr>
+      <p:grpSpPr>
+        <a:xfrm>
+          <a:off x="0" y="0"/>
+          <a:ext cx="0" cy="0"/>
+          <a:chOff x="0" y="0"/>
+          <a:chExt cx="0" cy="0"/>
+        </a:xfrm>
+      </p:grpSpPr>
+      <p:sp>
+        <p:nvSpPr>
+          <p:cNvPr id="2" name="Title 1">
+            <a:extLst>
+              <a:ext uri="{FF2B5EF4-FFF2-40B4-BE49-F238E27FC236}">
+                <a16:creationId xmlns:a16="http://schemas.microsoft.com/office/drawing/2014/main" id="{01D3D18F-656B-4824-83DB-D766E179D5B1}"/>
+              </a:ext>
+            </a:extLst>
+          </p:cNvPr>
+          <p:cNvSpPr>
+            <a:spLocks noGrp="1"/>
+          </p:cNvSpPr>
+          <p:nvPr>
+            <p:ph type="title"/>
+          </p:nvPr>
+        </p:nvSpPr>
+        <p:spPr/>
+        <p:txBody>
+          <a:bodyPr/>
+          <a:lstStyle/>
+          <a:p>
+            <a:r>
+              <a:rPr lang="en-US" dirty="0"/>
+              <a:t>Create Orders</a:t>
+            </a:r>
+            <a:endParaRPr lang="en-AU" dirty="0"/>
+          </a:p>
+        </p:txBody>
+      </p:sp>
+      <p:sp>
+        <p:nvSpPr>
+          <p:cNvPr id="3" name="Content Placeholder 2">
+            <a:extLst>
+              <a:ext uri="{FF2B5EF4-FFF2-40B4-BE49-F238E27FC236}">
+                <a16:creationId xmlns:a16="http://schemas.microsoft.com/office/drawing/2014/main" id="{DD4BF2E0-5256-4287-B36B-778874803630}"/>
+              </a:ext>
+            </a:extLst>
+          </p:cNvPr>
+          <p:cNvSpPr>
+            <a:spLocks noGrp="1"/>
+          </p:cNvSpPr>
+          <p:nvPr>
+            <p:ph idx="1"/>
+          </p:nvPr>
+        </p:nvSpPr>
+        <p:spPr/>
+        <p:txBody>
+          <a:bodyPr>
+            <a:normAutofit/>
+          </a:bodyPr>
+          <a:lstStyle/>
+          <a:p>
+            <a:r>
+              <a:rPr lang="en-US" dirty="0"/>
+              <a:t>Order more than one items, extra items price takes 10% discount</a:t>
+            </a:r>
+          </a:p>
+          <a:p>
+            <a:pPr marL="0" indent="0">
+              <a:buNone/>
+            </a:pPr>
+            <a:endParaRPr lang="en-US" dirty="0"/>
+          </a:p>
+          <a:p>
+            <a:r>
+              <a:rPr lang="en-US" dirty="0"/>
+              <a:t>An order with items total of original price greater than 3000 get High priority, greater than 1000 get normal priority, otherwise Low priority</a:t>
+            </a:r>
+          </a:p>
+          <a:p>
+            <a:endParaRPr lang="en-US" dirty="0"/>
+          </a:p>
+          <a:p>
+            <a:r>
+              <a:rPr lang="en-US" dirty="0"/>
+              <a:t>Delivery fee charge based on item type (not quantity of the item)</a:t>
+            </a:r>
+          </a:p>
+          <a:p>
+            <a:endParaRPr lang="en-US" dirty="0"/>
+          </a:p>
+          <a:p>
+            <a:r>
+              <a:rPr lang="en-US" dirty="0"/>
+              <a:t>High priority charge delivery fee of supplier delivery fee plus 10% * total order price, Normal priority 5%, Normal priority none</a:t>
+            </a:r>
+            <a:endParaRPr lang="en-AU" dirty="0"/>
+          </a:p>
+        </p:txBody>
+      </p:sp>
+    </p:spTree>
+    <p:extLst>
+      <p:ext uri="{BB962C8B-B14F-4D97-AF65-F5344CB8AC3E}">
+        <p14:creationId xmlns:p14="http://schemas.microsoft.com/office/powerpoint/2010/main" val="3892475721"/>
+      </p:ext>
+    </p:extLst>
+  </p:cSld>
+  <p:clrMapOvr>
+    <a:masterClrMapping/>
+  </p:clrMapOvr>
+</p:sld>
+</file>
+
+<file path=ppt/slides/slide7.xml><?xml version="1.0" encoding="utf-8"?>
+<p:sld xmlns:a="http://schemas.openxmlformats.org/drawingml/2006/main" xmlns:r="http://schemas.openxmlformats.org/officeDocument/2006/relationships" xmlns:p="http://schemas.openxmlformats.org/presentationml/2006/main">
+  <p:cSld>
+    <p:spTree>
+      <p:nvGrpSpPr>
+        <p:cNvPr id="1" name=""/>
+        <p:cNvGrpSpPr/>
+        <p:nvPr/>
+      </p:nvGrpSpPr>
+      <p:grpSpPr>
+        <a:xfrm>
+          <a:off x="0" y="0"/>
+          <a:ext cx="0" cy="0"/>
+          <a:chOff x="0" y="0"/>
+          <a:chExt cx="0" cy="0"/>
+        </a:xfrm>
+      </p:grpSpPr>
+      <p:sp>
+        <p:nvSpPr>
+          <p:cNvPr id="20" name="Rectangle 19">
+            <a:extLst>
+              <a:ext uri="{FF2B5EF4-FFF2-40B4-BE49-F238E27FC236}">
+                <a16:creationId xmlns:a16="http://schemas.microsoft.com/office/drawing/2014/main" id="{8443F961-0E68-4EB5-9269-665ED06AFA69}"/>
+              </a:ext>
+            </a:extLst>
+          </p:cNvPr>
+          <p:cNvSpPr/>
+          <p:nvPr/>
+        </p:nvSpPr>
+        <p:spPr>
+          <a:xfrm>
+            <a:off x="942975" y="721518"/>
+            <a:ext cx="10687050" cy="5414963"/>
+          </a:xfrm>
+          <a:prstGeom prst="rect">
+            <a:avLst/>
+          </a:prstGeom>
+        </p:spPr>
+        <p:style>
+          <a:lnRef idx="2">
+            <a:schemeClr val="accent6"/>
+          </a:lnRef>
+          <a:fillRef idx="1">
+            <a:schemeClr val="lt1"/>
+          </a:fillRef>
+          <a:effectRef idx="0">
+            <a:schemeClr val="accent6"/>
+          </a:effectRef>
+          <a:fontRef idx="minor">
+            <a:schemeClr val="dk1"/>
+          </a:fontRef>
+        </p:style>
+        <p:txBody>
+          <a:bodyPr rtlCol="0" anchor="ctr"/>
+          <a:lstStyle/>
+          <a:p>
+            <a:pPr algn="ctr"/>
+            <a:endParaRPr lang="en-AU"/>
+          </a:p>
+        </p:txBody>
+      </p:sp>
+      <p:sp>
+        <p:nvSpPr>
+          <p:cNvPr id="5" name="Rectangle 4">
+            <a:extLst>
+              <a:ext uri="{FF2B5EF4-FFF2-40B4-BE49-F238E27FC236}">
+                <a16:creationId xmlns:a16="http://schemas.microsoft.com/office/drawing/2014/main" id="{17241F59-17C9-4306-A24A-5307761ACCBD}"/>
+              </a:ext>
+            </a:extLst>
+          </p:cNvPr>
+          <p:cNvSpPr/>
+          <p:nvPr/>
+        </p:nvSpPr>
+        <p:spPr>
+          <a:xfrm>
+            <a:off x="1385888" y="1185864"/>
+            <a:ext cx="2471737" cy="757236"/>
+          </a:xfrm>
+          <a:prstGeom prst="rect">
+            <a:avLst/>
+          </a:prstGeom>
+        </p:spPr>
+        <p:style>
+          <a:lnRef idx="2">
+            <a:schemeClr val="accent6"/>
+          </a:lnRef>
+          <a:fillRef idx="1">
+            <a:schemeClr val="lt1"/>
+          </a:fillRef>
+          <a:effectRef idx="0">
+            <a:schemeClr val="accent6"/>
+          </a:effectRef>
+          <a:fontRef idx="minor">
+            <a:schemeClr val="dk1"/>
+          </a:fontRef>
+        </p:style>
+        <p:txBody>
+          <a:bodyPr rtlCol="0" anchor="ctr"/>
+          <a:lstStyle/>
+          <a:p>
+            <a:pPr algn="ctr"/>
+            <a:r>
+              <a:rPr lang="en-US" dirty="0"/>
+              <a:t>Create Order</a:t>
+            </a:r>
+            <a:endParaRPr lang="en-AU" dirty="0"/>
+          </a:p>
+        </p:txBody>
+      </p:sp>
+      <p:sp>
+        <p:nvSpPr>
+          <p:cNvPr id="8" name="Rectangle 7">
+            <a:extLst>
+              <a:ext uri="{FF2B5EF4-FFF2-40B4-BE49-F238E27FC236}">
+                <a16:creationId xmlns:a16="http://schemas.microsoft.com/office/drawing/2014/main" id="{33162631-B9B2-43D1-AD8D-A3AC25E8C397}"/>
+              </a:ext>
+            </a:extLst>
+          </p:cNvPr>
+          <p:cNvSpPr/>
+          <p:nvPr/>
+        </p:nvSpPr>
+        <p:spPr>
+          <a:xfrm>
+            <a:off x="4214813" y="1185864"/>
+            <a:ext cx="3200400" cy="1785936"/>
+          </a:xfrm>
+          <a:prstGeom prst="rect">
+            <a:avLst/>
+          </a:prstGeom>
+        </p:spPr>
+        <p:style>
+          <a:lnRef idx="2">
+            <a:schemeClr val="accent6"/>
+          </a:lnRef>
+          <a:fillRef idx="1">
+            <a:schemeClr val="lt1"/>
+          </a:fillRef>
+          <a:effectRef idx="0">
+            <a:schemeClr val="accent6"/>
+          </a:effectRef>
+          <a:fontRef idx="minor">
+            <a:schemeClr val="dk1"/>
+          </a:fontRef>
+        </p:style>
+        <p:txBody>
+          <a:bodyPr rtlCol="0" anchor="ctr"/>
+          <a:lstStyle/>
+          <a:p>
+            <a:pPr algn="ctr"/>
+            <a:r>
+              <a:rPr lang="en-US" dirty="0"/>
+              <a:t>Add Item</a:t>
+            </a:r>
+          </a:p>
+          <a:p>
+            <a:pPr algn="ctr"/>
+            <a:endParaRPr lang="en-AU" dirty="0"/>
+          </a:p>
+        </p:txBody>
+      </p:sp>
+      <p:sp>
+        <p:nvSpPr>
+          <p:cNvPr id="9" name="Rectangle 8">
+            <a:extLst>
+              <a:ext uri="{FF2B5EF4-FFF2-40B4-BE49-F238E27FC236}">
+                <a16:creationId xmlns:a16="http://schemas.microsoft.com/office/drawing/2014/main" id="{29E5FE2D-C732-41A3-BB8C-E28359858B67}"/>
+              </a:ext>
+            </a:extLst>
+          </p:cNvPr>
+          <p:cNvSpPr/>
+          <p:nvPr/>
+        </p:nvSpPr>
+        <p:spPr>
+          <a:xfrm>
+            <a:off x="4357688" y="2078832"/>
+            <a:ext cx="2914650" cy="757238"/>
+          </a:xfrm>
+          <a:prstGeom prst="rect">
+            <a:avLst/>
+          </a:prstGeom>
+        </p:spPr>
+        <p:style>
+          <a:lnRef idx="2">
+            <a:schemeClr val="accent1">
+              <a:shade val="50000"/>
+            </a:schemeClr>
+          </a:lnRef>
+          <a:fillRef idx="1">
+            <a:schemeClr val="accent1"/>
+          </a:fillRef>
+          <a:effectRef idx="0">
+            <a:schemeClr val="accent1"/>
+          </a:effectRef>
+          <a:fontRef idx="minor">
+            <a:schemeClr val="lt1"/>
+          </a:fontRef>
+        </p:style>
+        <p:txBody>
+          <a:bodyPr rtlCol="0" anchor="ctr"/>
+          <a:lstStyle/>
+          <a:p>
+            <a:pPr algn="ctr"/>
+            <a:r>
+              <a:rPr lang="en-AU" dirty="0"/>
+              <a:t>OrderItemAddedEvent</a:t>
+            </a:r>
+          </a:p>
+        </p:txBody>
+      </p:sp>
+      <p:cxnSp>
+        <p:nvCxnSpPr>
+          <p:cNvPr id="11" name="Straight Arrow Connector 10">
+            <a:extLst>
+              <a:ext uri="{FF2B5EF4-FFF2-40B4-BE49-F238E27FC236}">
+                <a16:creationId xmlns:a16="http://schemas.microsoft.com/office/drawing/2014/main" id="{E206FB03-405D-498E-ABEE-CBD5FED74D5A}"/>
+              </a:ext>
+            </a:extLst>
+          </p:cNvPr>
+          <p:cNvCxnSpPr>
+            <a:cxnSpLocks/>
+            <a:stCxn id="5" idx="3"/>
+          </p:cNvCxnSpPr>
+          <p:nvPr/>
+        </p:nvCxnSpPr>
+        <p:spPr>
+          <a:xfrm>
+            <a:off x="3857625" y="1564482"/>
+            <a:ext cx="500063" cy="0"/>
+          </a:xfrm>
+          <a:prstGeom prst="straightConnector1">
+            <a:avLst/>
+          </a:prstGeom>
+          <a:ln>
+            <a:tailEnd type="triangle"/>
+          </a:ln>
+        </p:spPr>
+        <p:style>
+          <a:lnRef idx="1">
+            <a:schemeClr val="accent1"/>
+          </a:lnRef>
+          <a:fillRef idx="0">
+            <a:schemeClr val="accent1"/>
+          </a:fillRef>
+          <a:effectRef idx="0">
+            <a:schemeClr val="accent1"/>
+          </a:effectRef>
+          <a:fontRef idx="minor">
+            <a:schemeClr val="tx1"/>
+          </a:fontRef>
+        </p:style>
+      </p:cxnSp>
+      <p:sp>
+        <p:nvSpPr>
+          <p:cNvPr id="12" name="Rectangle 11">
+            <a:extLst>
+              <a:ext uri="{FF2B5EF4-FFF2-40B4-BE49-F238E27FC236}">
+                <a16:creationId xmlns:a16="http://schemas.microsoft.com/office/drawing/2014/main" id="{BD6CB1F1-D093-4917-8EBD-EAB699160785}"/>
+              </a:ext>
+            </a:extLst>
+          </p:cNvPr>
+          <p:cNvSpPr/>
+          <p:nvPr/>
+        </p:nvSpPr>
+        <p:spPr>
+          <a:xfrm>
+            <a:off x="4214813" y="3350418"/>
+            <a:ext cx="3200400" cy="1943100"/>
+          </a:xfrm>
+          <a:prstGeom prst="rect">
+            <a:avLst/>
+          </a:prstGeom>
+        </p:spPr>
+        <p:style>
+          <a:lnRef idx="2">
+            <a:schemeClr val="accent6"/>
+          </a:lnRef>
+          <a:fillRef idx="1">
+            <a:schemeClr val="lt1"/>
+          </a:fillRef>
+          <a:effectRef idx="0">
+            <a:schemeClr val="accent6"/>
+          </a:effectRef>
+          <a:fontRef idx="minor">
+            <a:schemeClr val="dk1"/>
+          </a:fontRef>
+        </p:style>
+        <p:txBody>
+          <a:bodyPr rtlCol="0" anchor="ctr"/>
+          <a:lstStyle/>
+          <a:p>
+            <a:pPr algn="ctr"/>
+            <a:r>
+              <a:rPr lang="en-US" dirty="0"/>
+              <a:t>Apply Order Priority</a:t>
+            </a:r>
+            <a:endParaRPr lang="en-AU" dirty="0"/>
+          </a:p>
+        </p:txBody>
+      </p:sp>
+      <p:sp>
+        <p:nvSpPr>
+          <p:cNvPr id="14" name="Rectangle 13">
+            <a:extLst>
+              <a:ext uri="{FF2B5EF4-FFF2-40B4-BE49-F238E27FC236}">
+                <a16:creationId xmlns:a16="http://schemas.microsoft.com/office/drawing/2014/main" id="{B303C029-2264-45F2-8F8C-2EB12910D1DE}"/>
+              </a:ext>
+            </a:extLst>
+          </p:cNvPr>
+          <p:cNvSpPr/>
+          <p:nvPr/>
+        </p:nvSpPr>
+        <p:spPr>
+          <a:xfrm>
+            <a:off x="4357688" y="4536280"/>
+            <a:ext cx="2914650" cy="757238"/>
+          </a:xfrm>
+          <a:prstGeom prst="rect">
+            <a:avLst/>
+          </a:prstGeom>
+        </p:spPr>
+        <p:style>
+          <a:lnRef idx="2">
+            <a:schemeClr val="accent1">
+              <a:shade val="50000"/>
+            </a:schemeClr>
+          </a:lnRef>
+          <a:fillRef idx="1">
+            <a:schemeClr val="accent1"/>
+          </a:fillRef>
+          <a:effectRef idx="0">
+            <a:schemeClr val="accent1"/>
+          </a:effectRef>
+          <a:fontRef idx="minor">
+            <a:schemeClr val="lt1"/>
+          </a:fontRef>
+        </p:style>
+        <p:txBody>
+          <a:bodyPr rtlCol="0" anchor="ctr"/>
+          <a:lstStyle/>
+          <a:p>
+            <a:pPr algn="ctr"/>
+            <a:r>
+              <a:rPr lang="en-AU" dirty="0"/>
+              <a:t>OrderPriorityChangedEvent</a:t>
+            </a:r>
+          </a:p>
+        </p:txBody>
+      </p:sp>
+      <p:cxnSp>
+        <p:nvCxnSpPr>
+          <p:cNvPr id="16" name="Straight Arrow Connector 15">
+            <a:extLst>
+              <a:ext uri="{FF2B5EF4-FFF2-40B4-BE49-F238E27FC236}">
+                <a16:creationId xmlns:a16="http://schemas.microsoft.com/office/drawing/2014/main" id="{45FD4407-AF13-4719-A4A5-C329B2A66C3D}"/>
+              </a:ext>
+            </a:extLst>
+          </p:cNvPr>
+          <p:cNvCxnSpPr>
+            <a:cxnSpLocks/>
+          </p:cNvCxnSpPr>
+          <p:nvPr/>
+        </p:nvCxnSpPr>
+        <p:spPr>
+          <a:xfrm>
+            <a:off x="6972300" y="2657475"/>
+            <a:ext cx="0" cy="1014413"/>
+          </a:xfrm>
+          <a:prstGeom prst="straightConnector1">
+            <a:avLst/>
+          </a:prstGeom>
+          <a:ln>
+            <a:tailEnd type="triangle"/>
+          </a:ln>
+        </p:spPr>
+        <p:style>
+          <a:lnRef idx="1">
+            <a:schemeClr val="accent1"/>
+          </a:lnRef>
+          <a:fillRef idx="0">
+            <a:schemeClr val="accent1"/>
+          </a:fillRef>
+          <a:effectRef idx="0">
+            <a:schemeClr val="accent1"/>
+          </a:effectRef>
+          <a:fontRef idx="minor">
+            <a:schemeClr val="tx1"/>
+          </a:fontRef>
+        </p:style>
+      </p:cxnSp>
+      <p:sp>
+        <p:nvSpPr>
+          <p:cNvPr id="17" name="Rectangle 16">
+            <a:extLst>
+              <a:ext uri="{FF2B5EF4-FFF2-40B4-BE49-F238E27FC236}">
+                <a16:creationId xmlns:a16="http://schemas.microsoft.com/office/drawing/2014/main" id="{5C4835B0-0BD2-4889-AB27-7690F1C71815}"/>
+              </a:ext>
+            </a:extLst>
+          </p:cNvPr>
+          <p:cNvSpPr/>
+          <p:nvPr/>
+        </p:nvSpPr>
+        <p:spPr>
+          <a:xfrm>
+            <a:off x="8043862" y="4293393"/>
+            <a:ext cx="3200401" cy="1078708"/>
+          </a:xfrm>
+          <a:prstGeom prst="rect">
+            <a:avLst/>
+          </a:prstGeom>
+        </p:spPr>
+        <p:style>
+          <a:lnRef idx="2">
+            <a:schemeClr val="accent6"/>
+          </a:lnRef>
+          <a:fillRef idx="1">
+            <a:schemeClr val="lt1"/>
+          </a:fillRef>
+          <a:effectRef idx="0">
+            <a:schemeClr val="accent6"/>
+          </a:effectRef>
+          <a:fontRef idx="minor">
+            <a:schemeClr val="dk1"/>
+          </a:fontRef>
+        </p:style>
+        <p:txBody>
+          <a:bodyPr rtlCol="0" anchor="ctr"/>
+          <a:lstStyle/>
+          <a:p>
+            <a:pPr algn="ctr"/>
+            <a:r>
+              <a:rPr lang="en-US" dirty="0"/>
+              <a:t>Calculate Delivery Fee</a:t>
+            </a:r>
+            <a:endParaRPr lang="en-AU" dirty="0"/>
+          </a:p>
+        </p:txBody>
+      </p:sp>
+      <p:cxnSp>
+        <p:nvCxnSpPr>
+          <p:cNvPr id="19" name="Straight Arrow Connector 18">
+            <a:extLst>
+              <a:ext uri="{FF2B5EF4-FFF2-40B4-BE49-F238E27FC236}">
+                <a16:creationId xmlns:a16="http://schemas.microsoft.com/office/drawing/2014/main" id="{D64FFDED-3EFE-4FCA-BB07-81200C7A31CF}"/>
+              </a:ext>
+            </a:extLst>
+          </p:cNvPr>
+          <p:cNvCxnSpPr>
+            <a:cxnSpLocks/>
+          </p:cNvCxnSpPr>
+          <p:nvPr/>
+        </p:nvCxnSpPr>
+        <p:spPr>
+          <a:xfrm>
+            <a:off x="6972300" y="4914899"/>
+            <a:ext cx="1271588" cy="0"/>
+          </a:xfrm>
+          <a:prstGeom prst="straightConnector1">
+            <a:avLst/>
+          </a:prstGeom>
+          <a:ln>
+            <a:tailEnd type="triangle"/>
+          </a:ln>
+        </p:spPr>
+        <p:style>
+          <a:lnRef idx="1">
+            <a:schemeClr val="accent1"/>
+          </a:lnRef>
+          <a:fillRef idx="0">
+            <a:schemeClr val="accent1"/>
+          </a:fillRef>
+          <a:effectRef idx="0">
+            <a:schemeClr val="accent1"/>
+          </a:effectRef>
+          <a:fontRef idx="minor">
+            <a:schemeClr val="tx1"/>
+          </a:fontRef>
+        </p:style>
+      </p:cxnSp>
+    </p:spTree>
+    <p:extLst>
+      <p:ext uri="{BB962C8B-B14F-4D97-AF65-F5344CB8AC3E}">
+        <p14:creationId xmlns:p14="http://schemas.microsoft.com/office/powerpoint/2010/main" val="3128870451"/>
       </p:ext>
     </p:extLst>
   </p:cSld>

</xml_diff>